<commit_message>
Guide Revision for ah.exe 3.16
</commit_message>
<xml_diff>
--- a/ah_Guide.pptx
+++ b/ah_Guide.pptx
@@ -211,7 +211,7 @@
           <a:p>
             <a:fld id="{C54E0FF4-18DC-4E4B-88E5-018E02D95D66}" type="datetimeFigureOut">
               <a:rPr lang="ko-KR" altLang="en-US" smtClean="0"/>
-              <a:t>2022-06-22</a:t>
+              <a:t>2022-08-16</a:t>
             </a:fld>
             <a:endParaRPr lang="ko-KR" altLang="en-US"/>
           </a:p>
@@ -765,7 +765,7 @@
           <a:p>
             <a:fld id="{689CBBFC-FF1D-4E3F-9311-282276153F89}" type="datetimeFigureOut">
               <a:rPr lang="ko-KR" altLang="en-US" smtClean="0"/>
-              <a:t>2022-06-22</a:t>
+              <a:t>2022-08-16</a:t>
             </a:fld>
             <a:endParaRPr lang="ko-KR" altLang="en-US"/>
           </a:p>
@@ -1026,7 +1026,7 @@
           <a:p>
             <a:fld id="{689CBBFC-FF1D-4E3F-9311-282276153F89}" type="datetimeFigureOut">
               <a:rPr lang="ko-KR" altLang="en-US" smtClean="0"/>
-              <a:t>2022-06-22</a:t>
+              <a:t>2022-08-16</a:t>
             </a:fld>
             <a:endParaRPr lang="ko-KR" altLang="en-US"/>
           </a:p>
@@ -1206,7 +1206,7 @@
           <a:p>
             <a:fld id="{689CBBFC-FF1D-4E3F-9311-282276153F89}" type="datetimeFigureOut">
               <a:rPr lang="ko-KR" altLang="en-US" smtClean="0"/>
-              <a:t>2022-06-22</a:t>
+              <a:t>2022-08-16</a:t>
             </a:fld>
             <a:endParaRPr lang="ko-KR" altLang="en-US"/>
           </a:p>
@@ -1376,7 +1376,7 @@
           <a:p>
             <a:fld id="{689CBBFC-FF1D-4E3F-9311-282276153F89}" type="datetimeFigureOut">
               <a:rPr lang="ko-KR" altLang="en-US" smtClean="0"/>
-              <a:t>2022-06-22</a:t>
+              <a:t>2022-08-16</a:t>
             </a:fld>
             <a:endParaRPr lang="ko-KR" altLang="en-US"/>
           </a:p>
@@ -1622,7 +1622,7 @@
           <a:p>
             <a:fld id="{689CBBFC-FF1D-4E3F-9311-282276153F89}" type="datetimeFigureOut">
               <a:rPr lang="ko-KR" altLang="en-US" smtClean="0"/>
-              <a:t>2022-06-22</a:t>
+              <a:t>2022-08-16</a:t>
             </a:fld>
             <a:endParaRPr lang="ko-KR" altLang="en-US"/>
           </a:p>
@@ -1854,7 +1854,7 @@
           <a:p>
             <a:fld id="{689CBBFC-FF1D-4E3F-9311-282276153F89}" type="datetimeFigureOut">
               <a:rPr lang="ko-KR" altLang="en-US" smtClean="0"/>
-              <a:t>2022-06-22</a:t>
+              <a:t>2022-08-16</a:t>
             </a:fld>
             <a:endParaRPr lang="ko-KR" altLang="en-US"/>
           </a:p>
@@ -2221,7 +2221,7 @@
           <a:p>
             <a:fld id="{689CBBFC-FF1D-4E3F-9311-282276153F89}" type="datetimeFigureOut">
               <a:rPr lang="ko-KR" altLang="en-US" smtClean="0"/>
-              <a:t>2022-06-22</a:t>
+              <a:t>2022-08-16</a:t>
             </a:fld>
             <a:endParaRPr lang="ko-KR" altLang="en-US"/>
           </a:p>
@@ -2339,7 +2339,7 @@
           <a:p>
             <a:fld id="{689CBBFC-FF1D-4E3F-9311-282276153F89}" type="datetimeFigureOut">
               <a:rPr lang="ko-KR" altLang="en-US" smtClean="0"/>
-              <a:t>2022-06-22</a:t>
+              <a:t>2022-08-16</a:t>
             </a:fld>
             <a:endParaRPr lang="ko-KR" altLang="en-US"/>
           </a:p>
@@ -2434,7 +2434,7 @@
           <a:p>
             <a:fld id="{689CBBFC-FF1D-4E3F-9311-282276153F89}" type="datetimeFigureOut">
               <a:rPr lang="ko-KR" altLang="en-US" smtClean="0"/>
-              <a:t>2022-06-22</a:t>
+              <a:t>2022-08-16</a:t>
             </a:fld>
             <a:endParaRPr lang="ko-KR" altLang="en-US"/>
           </a:p>
@@ -2711,7 +2711,7 @@
           <a:p>
             <a:fld id="{689CBBFC-FF1D-4E3F-9311-282276153F89}" type="datetimeFigureOut">
               <a:rPr lang="ko-KR" altLang="en-US" smtClean="0"/>
-              <a:t>2022-06-22</a:t>
+              <a:t>2022-08-16</a:t>
             </a:fld>
             <a:endParaRPr lang="ko-KR" altLang="en-US"/>
           </a:p>
@@ -2964,7 +2964,7 @@
           <a:p>
             <a:fld id="{689CBBFC-FF1D-4E3F-9311-282276153F89}" type="datetimeFigureOut">
               <a:rPr lang="ko-KR" altLang="en-US" smtClean="0"/>
-              <a:t>2022-06-22</a:t>
+              <a:t>2022-08-16</a:t>
             </a:fld>
             <a:endParaRPr lang="ko-KR" altLang="en-US"/>
           </a:p>
@@ -3177,7 +3177,7 @@
           <a:p>
             <a:fld id="{689CBBFC-FF1D-4E3F-9311-282276153F89}" type="datetimeFigureOut">
               <a:rPr lang="ko-KR" altLang="en-US" smtClean="0"/>
-              <a:t>2022-06-22</a:t>
+              <a:t>2022-08-16</a:t>
             </a:fld>
             <a:endParaRPr lang="ko-KR" altLang="en-US"/>
           </a:p>
@@ -3610,8 +3610,19 @@
                 <a:latin typeface="맑은 고딕" pitchFamily="50" charset="-127"/>
                 <a:ea typeface="맑은 고딕" pitchFamily="50" charset="-127"/>
               </a:rPr>
-              <a:t>“ah.exe”  version 2.16</a:t>
-            </a:r>
+              <a:t>“ah.exe”  version </a:t>
+            </a:r>
+            <a:r>
+              <a:rPr lang="en-US" altLang="ko-KR" sz="4400" b="1" dirty="0" smtClean="0">
+                <a:latin typeface="맑은 고딕" pitchFamily="50" charset="-127"/>
+                <a:ea typeface="맑은 고딕" pitchFamily="50" charset="-127"/>
+              </a:rPr>
+              <a:t>3.16</a:t>
+            </a:r>
+            <a:endParaRPr lang="en-US" altLang="ko-KR" sz="4400" b="1" dirty="0" smtClean="0">
+              <a:latin typeface="맑은 고딕" pitchFamily="50" charset="-127"/>
+              <a:ea typeface="맑은 고딕" pitchFamily="50" charset="-127"/>
+            </a:endParaRPr>
           </a:p>
           <a:p>
             <a:pPr algn="ctr"/>
@@ -3653,12 +3664,8 @@
           <a:p>
             <a:pPr algn="ctr"/>
             <a:r>
-              <a:rPr lang="en-US" altLang="ko-KR" sz="2000" dirty="0"/>
-              <a:t>2020. </a:t>
-            </a:r>
-            <a:r>
               <a:rPr lang="en-US" altLang="ko-KR" sz="2000" dirty="0" smtClean="0"/>
-              <a:t>10. 14</a:t>
+              <a:t>2022. 08. 16</a:t>
             </a:r>
             <a:endParaRPr lang="ko-KR" altLang="en-US" sz="2000" dirty="0"/>
           </a:p>
@@ -13350,15 +13357,7 @@
                   <a:srgbClr val="FF0000"/>
                 </a:solidFill>
               </a:rPr>
-              <a:t> </a:t>
-            </a:r>
-            <a:r>
-              <a:rPr lang="en-US" altLang="ko-KR" sz="1000" dirty="0" smtClean="0">
-                <a:solidFill>
-                  <a:srgbClr val="FF0000"/>
-                </a:solidFill>
-              </a:rPr>
-              <a:t>value </a:t>
+              <a:t> value </a:t>
             </a:r>
             <a:r>
               <a:rPr lang="en-US" altLang="ko-KR" sz="1000" dirty="0" smtClean="0"/>

</xml_diff>